<commit_message>
Plot background-color and errant print statement
Forced background-color of visualizer plots to always be white as the plots weren't visible in the tskit tutorials website with a transparent background (#26). Also removed a print statement that was being used for debugging polytomies but shouldn't be on the main branch (#27).
</commit_message>
<xml_diff>
--- a/tskit_presentation.pptx
+++ b/tskit_presentation.pptx
@@ -5,7 +5,7 @@
     <p:sldMasterId id="2147483648" r:id="rId1"/>
   </p:sldMasterIdLst>
   <p:notesMasterIdLst>
-    <p:notesMasterId r:id="rId25"/>
+    <p:notesMasterId r:id="rId26"/>
   </p:notesMasterIdLst>
   <p:sldIdLst>
     <p:sldId id="258" r:id="rId2"/>
@@ -31,6 +31,7 @@
     <p:sldId id="271" r:id="rId22"/>
     <p:sldId id="274" r:id="rId23"/>
     <p:sldId id="278" r:id="rId24"/>
+    <p:sldId id="279" r:id="rId25"/>
   </p:sldIdLst>
   <p:sldSz cx="12192000" cy="6858000"/>
   <p:notesSz cx="6858000" cy="9144000"/>
@@ -219,7 +220,7 @@
           <a:p>
             <a:fld id="{54BE1BF4-E52A-3947-AAF8-F81D869E3D7F}" type="datetimeFigureOut">
               <a:rPr lang="en-US" smtClean="0"/>
-              <a:t>7/17/23</a:t>
+              <a:t>7/27/23</a:t>
             </a:fld>
             <a:endParaRPr lang="en-US"/>
           </a:p>
@@ -885,7 +886,7 @@
           <a:p>
             <a:fld id="{84C09D2D-DDE8-084A-97EA-5E9E2E477616}" type="datetimeFigureOut">
               <a:rPr lang="en-US" smtClean="0"/>
-              <a:t>7/17/23</a:t>
+              <a:t>7/27/23</a:t>
             </a:fld>
             <a:endParaRPr lang="en-US"/>
           </a:p>
@@ -1083,7 +1084,7 @@
           <a:p>
             <a:fld id="{84C09D2D-DDE8-084A-97EA-5E9E2E477616}" type="datetimeFigureOut">
               <a:rPr lang="en-US" smtClean="0"/>
-              <a:t>7/17/23</a:t>
+              <a:t>7/27/23</a:t>
             </a:fld>
             <a:endParaRPr lang="en-US"/>
           </a:p>
@@ -1291,7 +1292,7 @@
           <a:p>
             <a:fld id="{84C09D2D-DDE8-084A-97EA-5E9E2E477616}" type="datetimeFigureOut">
               <a:rPr lang="en-US" smtClean="0"/>
-              <a:t>7/17/23</a:t>
+              <a:t>7/27/23</a:t>
             </a:fld>
             <a:endParaRPr lang="en-US"/>
           </a:p>
@@ -1489,7 +1490,7 @@
           <a:p>
             <a:fld id="{84C09D2D-DDE8-084A-97EA-5E9E2E477616}" type="datetimeFigureOut">
               <a:rPr lang="en-US" smtClean="0"/>
-              <a:t>7/17/23</a:t>
+              <a:t>7/27/23</a:t>
             </a:fld>
             <a:endParaRPr lang="en-US"/>
           </a:p>
@@ -1764,7 +1765,7 @@
           <a:p>
             <a:fld id="{84C09D2D-DDE8-084A-97EA-5E9E2E477616}" type="datetimeFigureOut">
               <a:rPr lang="en-US" smtClean="0"/>
-              <a:t>7/17/23</a:t>
+              <a:t>7/27/23</a:t>
             </a:fld>
             <a:endParaRPr lang="en-US"/>
           </a:p>
@@ -2029,7 +2030,7 @@
           <a:p>
             <a:fld id="{84C09D2D-DDE8-084A-97EA-5E9E2E477616}" type="datetimeFigureOut">
               <a:rPr lang="en-US" smtClean="0"/>
-              <a:t>7/17/23</a:t>
+              <a:t>7/27/23</a:t>
             </a:fld>
             <a:endParaRPr lang="en-US"/>
           </a:p>
@@ -2441,7 +2442,7 @@
           <a:p>
             <a:fld id="{84C09D2D-DDE8-084A-97EA-5E9E2E477616}" type="datetimeFigureOut">
               <a:rPr lang="en-US" smtClean="0"/>
-              <a:t>7/17/23</a:t>
+              <a:t>7/27/23</a:t>
             </a:fld>
             <a:endParaRPr lang="en-US"/>
           </a:p>
@@ -2582,7 +2583,7 @@
           <a:p>
             <a:fld id="{84C09D2D-DDE8-084A-97EA-5E9E2E477616}" type="datetimeFigureOut">
               <a:rPr lang="en-US" smtClean="0"/>
-              <a:t>7/17/23</a:t>
+              <a:t>7/27/23</a:t>
             </a:fld>
             <a:endParaRPr lang="en-US"/>
           </a:p>
@@ -2695,7 +2696,7 @@
           <a:p>
             <a:fld id="{84C09D2D-DDE8-084A-97EA-5E9E2E477616}" type="datetimeFigureOut">
               <a:rPr lang="en-US" smtClean="0"/>
-              <a:t>7/17/23</a:t>
+              <a:t>7/27/23</a:t>
             </a:fld>
             <a:endParaRPr lang="en-US"/>
           </a:p>
@@ -3006,7 +3007,7 @@
           <a:p>
             <a:fld id="{84C09D2D-DDE8-084A-97EA-5E9E2E477616}" type="datetimeFigureOut">
               <a:rPr lang="en-US" smtClean="0"/>
-              <a:t>7/17/23</a:t>
+              <a:t>7/27/23</a:t>
             </a:fld>
             <a:endParaRPr lang="en-US"/>
           </a:p>
@@ -3294,7 +3295,7 @@
           <a:p>
             <a:fld id="{84C09D2D-DDE8-084A-97EA-5E9E2E477616}" type="datetimeFigureOut">
               <a:rPr lang="en-US" smtClean="0"/>
-              <a:t>7/17/23</a:t>
+              <a:t>7/27/23</a:t>
             </a:fld>
             <a:endParaRPr lang="en-US"/>
           </a:p>
@@ -3535,7 +3536,7 @@
           <a:p>
             <a:fld id="{84C09D2D-DDE8-084A-97EA-5E9E2E477616}" type="datetimeFigureOut">
               <a:rPr lang="en-US" smtClean="0"/>
-              <a:t>7/17/23</a:t>
+              <a:t>7/27/23</a:t>
             </a:fld>
             <a:endParaRPr lang="en-US"/>
           </a:p>
@@ -7398,22 +7399,6 @@
               <a:t>Requires a connection to the internet to load D3.js from a CDN</a:t>
             </a:r>
           </a:p>
-          <a:p>
-            <a:pPr>
-              <a:buFontTx/>
-              <a:buChar char="-"/>
-            </a:pPr>
-            <a:r>
-              <a:rPr lang="en-US" sz="2400" dirty="0">
-                <a:solidFill>
-                  <a:srgbClr val="043D4D"/>
-                </a:solidFill>
-                <a:latin typeface="Arial" panose="020B0604020202020204" pitchFamily="34" charset="0"/>
-                <a:cs typeface="Arial" panose="020B0604020202020204" pitchFamily="34" charset="0"/>
-              </a:rPr>
-              <a:t>Currently, uses D3.js v4, which is not the most recent version (I’m planning to update this)</a:t>
-            </a:r>
-          </a:p>
         </p:txBody>
       </p:sp>
       <p:sp>
@@ -7779,6 +7764,629 @@
     <p:extLst>
       <p:ext uri="{BB962C8B-B14F-4D97-AF65-F5344CB8AC3E}">
         <p14:creationId xmlns:p14="http://schemas.microsoft.com/office/powerpoint/2010/main" val="2507852968"/>
+      </p:ext>
+    </p:extLst>
+  </p:cSld>
+  <p:clrMapOvr>
+    <a:masterClrMapping/>
+  </p:clrMapOvr>
+</p:sld>
+</file>
+
+<file path=ppt/slides/slide24.xml><?xml version="1.0" encoding="utf-8"?>
+<p:sld xmlns:a="http://schemas.openxmlformats.org/drawingml/2006/main" xmlns:r="http://schemas.openxmlformats.org/officeDocument/2006/relationships" xmlns:p="http://schemas.openxmlformats.org/presentationml/2006/main">
+  <p:cSld>
+    <p:spTree>
+      <p:nvGrpSpPr>
+        <p:cNvPr id="1" name=""/>
+        <p:cNvGrpSpPr/>
+        <p:nvPr/>
+      </p:nvGrpSpPr>
+      <p:grpSpPr>
+        <a:xfrm>
+          <a:off x="0" y="0"/>
+          <a:ext cx="0" cy="0"/>
+          <a:chOff x="0" y="0"/>
+          <a:chExt cx="0" cy="0"/>
+        </a:xfrm>
+      </p:grpSpPr>
+      <p:sp>
+        <p:nvSpPr>
+          <p:cNvPr id="29" name="Rectangle 28">
+            <a:extLst>
+              <a:ext uri="{FF2B5EF4-FFF2-40B4-BE49-F238E27FC236}">
+                <a16:creationId xmlns:a16="http://schemas.microsoft.com/office/drawing/2014/main" id="{3AF2EC6B-AF3A-0E0F-5A2E-112E8C7B134A}"/>
+              </a:ext>
+            </a:extLst>
+          </p:cNvPr>
+          <p:cNvSpPr/>
+          <p:nvPr/>
+        </p:nvSpPr>
+        <p:spPr>
+          <a:xfrm>
+            <a:off x="0" y="0"/>
+            <a:ext cx="3635298" cy="2185639"/>
+          </a:xfrm>
+          <a:prstGeom prst="rect">
+            <a:avLst/>
+          </a:prstGeom>
+          <a:noFill/>
+          <a:ln w="34925">
+            <a:solidFill>
+              <a:schemeClr val="accent1"/>
+            </a:solidFill>
+          </a:ln>
+        </p:spPr>
+        <p:style>
+          <a:lnRef idx="2">
+            <a:schemeClr val="accent1">
+              <a:shade val="15000"/>
+            </a:schemeClr>
+          </a:lnRef>
+          <a:fillRef idx="1">
+            <a:schemeClr val="accent1"/>
+          </a:fillRef>
+          <a:effectRef idx="0">
+            <a:schemeClr val="accent1"/>
+          </a:effectRef>
+          <a:fontRef idx="minor">
+            <a:schemeClr val="lt1"/>
+          </a:fontRef>
+        </p:style>
+        <p:txBody>
+          <a:bodyPr rtlCol="0" anchor="ctr"/>
+          <a:lstStyle/>
+          <a:p>
+            <a:pPr algn="ctr"/>
+            <a:endParaRPr lang="en-US"/>
+          </a:p>
+        </p:txBody>
+      </p:sp>
+      <p:pic>
+        <p:nvPicPr>
+          <p:cNvPr id="5" name="Content Placeholder 4" descr="A screenshot of a computer&#10;&#10;Description automatically generated">
+            <a:extLst>
+              <a:ext uri="{FF2B5EF4-FFF2-40B4-BE49-F238E27FC236}">
+                <a16:creationId xmlns:a16="http://schemas.microsoft.com/office/drawing/2014/main" id="{28614BB7-6FE3-90DF-2F8C-A35538868C5C}"/>
+              </a:ext>
+            </a:extLst>
+          </p:cNvPr>
+          <p:cNvPicPr>
+            <a:picLocks noGrp="1" noChangeAspect="1"/>
+          </p:cNvPicPr>
+          <p:nvPr>
+            <p:ph idx="1"/>
+          </p:nvPr>
+        </p:nvPicPr>
+        <p:blipFill rotWithShape="1">
+          <a:blip r:embed="rId2"/>
+          <a:srcRect l="36085" t="36598" r="48749" b="40887"/>
+          <a:stretch/>
+        </p:blipFill>
+        <p:spPr>
+          <a:xfrm>
+            <a:off x="1455767" y="3612771"/>
+            <a:ext cx="1845131" cy="1711979"/>
+          </a:xfrm>
+        </p:spPr>
+      </p:pic>
+      <p:pic>
+        <p:nvPicPr>
+          <p:cNvPr id="6" name="Content Placeholder 4" descr="A screenshot of a computer&#10;&#10;Description automatically generated">
+            <a:extLst>
+              <a:ext uri="{FF2B5EF4-FFF2-40B4-BE49-F238E27FC236}">
+                <a16:creationId xmlns:a16="http://schemas.microsoft.com/office/drawing/2014/main" id="{C228AA54-A214-68CC-4720-F7B3B8029E6B}"/>
+              </a:ext>
+            </a:extLst>
+          </p:cNvPr>
+          <p:cNvPicPr>
+            <a:picLocks noChangeAspect="1"/>
+          </p:cNvPicPr>
+          <p:nvPr/>
+        </p:nvPicPr>
+        <p:blipFill rotWithShape="1">
+          <a:blip r:embed="rId2"/>
+          <a:srcRect l="20918" t="36842" r="63915" b="40642"/>
+          <a:stretch/>
+        </p:blipFill>
+        <p:spPr>
+          <a:xfrm>
+            <a:off x="198664" y="171248"/>
+            <a:ext cx="1845131" cy="1711979"/>
+          </a:xfrm>
+          <a:prstGeom prst="rect">
+            <a:avLst/>
+          </a:prstGeom>
+        </p:spPr>
+      </p:pic>
+      <p:pic>
+        <p:nvPicPr>
+          <p:cNvPr id="7" name="Content Placeholder 4" descr="A screenshot of a computer&#10;&#10;Description automatically generated">
+            <a:extLst>
+              <a:ext uri="{FF2B5EF4-FFF2-40B4-BE49-F238E27FC236}">
+                <a16:creationId xmlns:a16="http://schemas.microsoft.com/office/drawing/2014/main" id="{603CAB2B-9814-2C60-BC8C-2845E319C1EF}"/>
+              </a:ext>
+            </a:extLst>
+          </p:cNvPr>
+          <p:cNvPicPr>
+            <a:picLocks noChangeAspect="1"/>
+          </p:cNvPicPr>
+          <p:nvPr/>
+        </p:nvPicPr>
+        <p:blipFill rotWithShape="1">
+          <a:blip r:embed="rId2"/>
+          <a:srcRect l="50626" t="36598" r="34208" b="40887"/>
+          <a:stretch/>
+        </p:blipFill>
+        <p:spPr>
+          <a:xfrm>
+            <a:off x="3485950" y="2767667"/>
+            <a:ext cx="1845131" cy="1711979"/>
+          </a:xfrm>
+          <a:prstGeom prst="rect">
+            <a:avLst/>
+          </a:prstGeom>
+        </p:spPr>
+      </p:pic>
+      <p:pic>
+        <p:nvPicPr>
+          <p:cNvPr id="8" name="Content Placeholder 4" descr="A screenshot of a computer&#10;&#10;Description automatically generated">
+            <a:extLst>
+              <a:ext uri="{FF2B5EF4-FFF2-40B4-BE49-F238E27FC236}">
+                <a16:creationId xmlns:a16="http://schemas.microsoft.com/office/drawing/2014/main" id="{7BE69581-2AF4-DED2-E2A8-CE2C6E90C513}"/>
+              </a:ext>
+            </a:extLst>
+          </p:cNvPr>
+          <p:cNvPicPr>
+            <a:picLocks noChangeAspect="1"/>
+          </p:cNvPicPr>
+          <p:nvPr/>
+        </p:nvPicPr>
+        <p:blipFill rotWithShape="1">
+          <a:blip r:embed="rId2"/>
+          <a:srcRect l="36123" t="60320" r="48711" b="17165"/>
+          <a:stretch/>
+        </p:blipFill>
+        <p:spPr>
+          <a:xfrm>
+            <a:off x="3485949" y="4603371"/>
+            <a:ext cx="1845131" cy="1711979"/>
+          </a:xfrm>
+          <a:prstGeom prst="rect">
+            <a:avLst/>
+          </a:prstGeom>
+        </p:spPr>
+      </p:pic>
+      <p:pic>
+        <p:nvPicPr>
+          <p:cNvPr id="9" name="Content Placeholder 4" descr="A screenshot of a computer&#10;&#10;Description automatically generated">
+            <a:extLst>
+              <a:ext uri="{FF2B5EF4-FFF2-40B4-BE49-F238E27FC236}">
+                <a16:creationId xmlns:a16="http://schemas.microsoft.com/office/drawing/2014/main" id="{F496C411-0E36-2AA2-5129-4DC277E36DA2}"/>
+              </a:ext>
+            </a:extLst>
+          </p:cNvPr>
+          <p:cNvPicPr>
+            <a:picLocks noChangeAspect="1"/>
+          </p:cNvPicPr>
+          <p:nvPr/>
+        </p:nvPicPr>
+        <p:blipFill rotWithShape="1">
+          <a:blip r:embed="rId2"/>
+          <a:srcRect l="50626" t="13225" r="34208" b="64260"/>
+          <a:stretch/>
+        </p:blipFill>
+        <p:spPr>
+          <a:xfrm>
+            <a:off x="5510692" y="2767667"/>
+            <a:ext cx="1845131" cy="1711979"/>
+          </a:xfrm>
+          <a:prstGeom prst="rect">
+            <a:avLst/>
+          </a:prstGeom>
+        </p:spPr>
+      </p:pic>
+      <p:pic>
+        <p:nvPicPr>
+          <p:cNvPr id="10" name="Content Placeholder 4" descr="A screenshot of a computer&#10;&#10;Description automatically generated">
+            <a:extLst>
+              <a:ext uri="{FF2B5EF4-FFF2-40B4-BE49-F238E27FC236}">
+                <a16:creationId xmlns:a16="http://schemas.microsoft.com/office/drawing/2014/main" id="{E7562E6B-320E-C336-DC43-CF5CAC21E8FA}"/>
+              </a:ext>
+            </a:extLst>
+          </p:cNvPr>
+          <p:cNvPicPr>
+            <a:picLocks noChangeAspect="1"/>
+          </p:cNvPicPr>
+          <p:nvPr/>
+        </p:nvPicPr>
+        <p:blipFill rotWithShape="1">
+          <a:blip r:embed="rId2"/>
+          <a:srcRect l="36117" t="13225" r="48717" b="64260"/>
+          <a:stretch/>
+        </p:blipFill>
+        <p:spPr>
+          <a:xfrm>
+            <a:off x="7535434" y="2767667"/>
+            <a:ext cx="1845131" cy="1711979"/>
+          </a:xfrm>
+          <a:prstGeom prst="rect">
+            <a:avLst/>
+          </a:prstGeom>
+        </p:spPr>
+      </p:pic>
+      <p:pic>
+        <p:nvPicPr>
+          <p:cNvPr id="11" name="Content Placeholder 4" descr="A screenshot of a computer&#10;&#10;Description automatically generated">
+            <a:extLst>
+              <a:ext uri="{FF2B5EF4-FFF2-40B4-BE49-F238E27FC236}">
+                <a16:creationId xmlns:a16="http://schemas.microsoft.com/office/drawing/2014/main" id="{DA5A8329-725E-7DD2-42DE-8109B1ED69FF}"/>
+              </a:ext>
+            </a:extLst>
+          </p:cNvPr>
+          <p:cNvPicPr>
+            <a:picLocks noChangeAspect="1"/>
+          </p:cNvPicPr>
+          <p:nvPr/>
+        </p:nvPicPr>
+        <p:blipFill rotWithShape="1">
+          <a:blip r:embed="rId2"/>
+          <a:srcRect l="21420" t="13225" r="63414" b="64260"/>
+          <a:stretch/>
+        </p:blipFill>
+        <p:spPr>
+          <a:xfrm>
+            <a:off x="9560176" y="2756782"/>
+            <a:ext cx="1845131" cy="1711979"/>
+          </a:xfrm>
+          <a:prstGeom prst="rect">
+            <a:avLst/>
+          </a:prstGeom>
+        </p:spPr>
+      </p:pic>
+      <p:sp>
+        <p:nvSpPr>
+          <p:cNvPr id="12" name="TextBox 11">
+            <a:extLst>
+              <a:ext uri="{FF2B5EF4-FFF2-40B4-BE49-F238E27FC236}">
+                <a16:creationId xmlns:a16="http://schemas.microsoft.com/office/drawing/2014/main" id="{BE747820-AC02-A79D-97D5-658D0F376D52}"/>
+              </a:ext>
+            </a:extLst>
+          </p:cNvPr>
+          <p:cNvSpPr txBox="1"/>
+          <p:nvPr/>
+        </p:nvSpPr>
+        <p:spPr>
+          <a:xfrm>
+            <a:off x="2043795" y="842571"/>
+            <a:ext cx="1424877" cy="369332"/>
+          </a:xfrm>
+          <a:prstGeom prst="rect">
+            <a:avLst/>
+          </a:prstGeom>
+          <a:noFill/>
+        </p:spPr>
+        <p:txBody>
+          <a:bodyPr wrap="none" rtlCol="0">
+            <a:spAutoFit/>
+          </a:bodyPr>
+          <a:lstStyle/>
+          <a:p>
+            <a:r>
+              <a:rPr lang="en-US" dirty="0"/>
+              <a:t>Original ARG</a:t>
+            </a:r>
+          </a:p>
+        </p:txBody>
+      </p:sp>
+      <p:sp>
+        <p:nvSpPr>
+          <p:cNvPr id="13" name="TextBox 12">
+            <a:extLst>
+              <a:ext uri="{FF2B5EF4-FFF2-40B4-BE49-F238E27FC236}">
+                <a16:creationId xmlns:a16="http://schemas.microsoft.com/office/drawing/2014/main" id="{05402AA4-58F2-4EAD-FB21-8E1BB8567B93}"/>
+              </a:ext>
+            </a:extLst>
+          </p:cNvPr>
+          <p:cNvSpPr txBox="1"/>
+          <p:nvPr/>
+        </p:nvSpPr>
+        <p:spPr>
+          <a:xfrm>
+            <a:off x="688323" y="3299525"/>
+            <a:ext cx="1534886" cy="923330"/>
+          </a:xfrm>
+          <a:prstGeom prst="rect">
+            <a:avLst/>
+          </a:prstGeom>
+          <a:noFill/>
+        </p:spPr>
+        <p:txBody>
+          <a:bodyPr wrap="square" rtlCol="0">
+            <a:spAutoFit/>
+          </a:bodyPr>
+          <a:lstStyle/>
+          <a:p>
+            <a:r>
+              <a:rPr lang="en-US" dirty="0"/>
+              <a:t>Nodes can be highlighted for collapse</a:t>
+            </a:r>
+          </a:p>
+        </p:txBody>
+      </p:sp>
+      <p:sp>
+        <p:nvSpPr>
+          <p:cNvPr id="17" name="TextBox 16">
+            <a:extLst>
+              <a:ext uri="{FF2B5EF4-FFF2-40B4-BE49-F238E27FC236}">
+                <a16:creationId xmlns:a16="http://schemas.microsoft.com/office/drawing/2014/main" id="{0FC3921A-D9C1-60AA-DA4A-1E6266FE44DA}"/>
+              </a:ext>
+            </a:extLst>
+          </p:cNvPr>
+          <p:cNvSpPr txBox="1"/>
+          <p:nvPr/>
+        </p:nvSpPr>
+        <p:spPr>
+          <a:xfrm>
+            <a:off x="3887050" y="1843274"/>
+            <a:ext cx="3726786" cy="923330"/>
+          </a:xfrm>
+          <a:prstGeom prst="rect">
+            <a:avLst/>
+          </a:prstGeom>
+          <a:noFill/>
+        </p:spPr>
+        <p:txBody>
+          <a:bodyPr wrap="square" rtlCol="0">
+            <a:spAutoFit/>
+          </a:bodyPr>
+          <a:lstStyle/>
+          <a:p>
+            <a:r>
+              <a:rPr lang="en-US" dirty="0"/>
+              <a:t>If two neighboring nodes are marked for collapse, they automatically merge.</a:t>
+            </a:r>
+          </a:p>
+        </p:txBody>
+      </p:sp>
+      <p:sp>
+        <p:nvSpPr>
+          <p:cNvPr id="18" name="TextBox 17">
+            <a:extLst>
+              <a:ext uri="{FF2B5EF4-FFF2-40B4-BE49-F238E27FC236}">
+                <a16:creationId xmlns:a16="http://schemas.microsoft.com/office/drawing/2014/main" id="{514EB6B7-3226-5C81-3839-E95C2EE856D8}"/>
+              </a:ext>
+            </a:extLst>
+          </p:cNvPr>
+          <p:cNvSpPr txBox="1"/>
+          <p:nvPr/>
+        </p:nvSpPr>
+        <p:spPr>
+          <a:xfrm>
+            <a:off x="7696783" y="1833452"/>
+            <a:ext cx="3726786" cy="923330"/>
+          </a:xfrm>
+          <a:prstGeom prst="rect">
+            <a:avLst/>
+          </a:prstGeom>
+          <a:noFill/>
+        </p:spPr>
+        <p:txBody>
+          <a:bodyPr wrap="square" rtlCol="0">
+            <a:spAutoFit/>
+          </a:bodyPr>
+          <a:lstStyle/>
+          <a:p>
+            <a:r>
+              <a:rPr lang="en-US" dirty="0"/>
+              <a:t>Collapsed nodes will continue to merge with neighboring nodes that are later marked for collapse.</a:t>
+            </a:r>
+          </a:p>
+        </p:txBody>
+      </p:sp>
+      <p:sp>
+        <p:nvSpPr>
+          <p:cNvPr id="19" name="TextBox 18">
+            <a:extLst>
+              <a:ext uri="{FF2B5EF4-FFF2-40B4-BE49-F238E27FC236}">
+                <a16:creationId xmlns:a16="http://schemas.microsoft.com/office/drawing/2014/main" id="{30FCA8AB-3134-85C3-B5F4-C5763D8DC7A3}"/>
+              </a:ext>
+            </a:extLst>
+          </p:cNvPr>
+          <p:cNvSpPr txBox="1"/>
+          <p:nvPr/>
+        </p:nvSpPr>
+        <p:spPr>
+          <a:xfrm>
+            <a:off x="5510692" y="4997695"/>
+            <a:ext cx="3726786" cy="646331"/>
+          </a:xfrm>
+          <a:prstGeom prst="rect">
+            <a:avLst/>
+          </a:prstGeom>
+          <a:noFill/>
+        </p:spPr>
+        <p:txBody>
+          <a:bodyPr wrap="square" rtlCol="0">
+            <a:spAutoFit/>
+          </a:bodyPr>
+          <a:lstStyle/>
+          <a:p>
+            <a:r>
+              <a:rPr lang="en-US" dirty="0"/>
+              <a:t>These nodes are not neighbors and will not merge.</a:t>
+            </a:r>
+          </a:p>
+        </p:txBody>
+      </p:sp>
+      <p:cxnSp>
+        <p:nvCxnSpPr>
+          <p:cNvPr id="24" name="Straight Arrow Connector 23">
+            <a:extLst>
+              <a:ext uri="{FF2B5EF4-FFF2-40B4-BE49-F238E27FC236}">
+                <a16:creationId xmlns:a16="http://schemas.microsoft.com/office/drawing/2014/main" id="{3CF5D952-16E5-4638-E767-C4B01625A248}"/>
+              </a:ext>
+            </a:extLst>
+          </p:cNvPr>
+          <p:cNvCxnSpPr>
+            <a:cxnSpLocks/>
+          </p:cNvCxnSpPr>
+          <p:nvPr/>
+        </p:nvCxnSpPr>
+        <p:spPr>
+          <a:xfrm rot="-2700000">
+            <a:off x="3090770" y="4202234"/>
+            <a:ext cx="335521" cy="0"/>
+          </a:xfrm>
+          <a:prstGeom prst="straightConnector1">
+            <a:avLst/>
+          </a:prstGeom>
+          <a:ln w="50800">
+            <a:tailEnd type="triangle"/>
+          </a:ln>
+        </p:spPr>
+        <p:style>
+          <a:lnRef idx="1">
+            <a:schemeClr val="accent1"/>
+          </a:lnRef>
+          <a:fillRef idx="0">
+            <a:schemeClr val="accent1"/>
+          </a:fillRef>
+          <a:effectRef idx="0">
+            <a:schemeClr val="accent1"/>
+          </a:effectRef>
+          <a:fontRef idx="minor">
+            <a:schemeClr val="tx1"/>
+          </a:fontRef>
+        </p:style>
+      </p:cxnSp>
+      <p:cxnSp>
+        <p:nvCxnSpPr>
+          <p:cNvPr id="26" name="Straight Arrow Connector 25">
+            <a:extLst>
+              <a:ext uri="{FF2B5EF4-FFF2-40B4-BE49-F238E27FC236}">
+                <a16:creationId xmlns:a16="http://schemas.microsoft.com/office/drawing/2014/main" id="{E45F46FA-799B-12A4-E186-E44CBD5373C0}"/>
+              </a:ext>
+            </a:extLst>
+          </p:cNvPr>
+          <p:cNvCxnSpPr>
+            <a:cxnSpLocks/>
+          </p:cNvCxnSpPr>
+          <p:nvPr/>
+        </p:nvCxnSpPr>
+        <p:spPr>
+          <a:xfrm>
+            <a:off x="7281457" y="3623656"/>
+            <a:ext cx="335521" cy="0"/>
+          </a:xfrm>
+          <a:prstGeom prst="straightConnector1">
+            <a:avLst/>
+          </a:prstGeom>
+          <a:ln w="50800">
+            <a:tailEnd type="triangle"/>
+          </a:ln>
+        </p:spPr>
+        <p:style>
+          <a:lnRef idx="1">
+            <a:schemeClr val="accent1"/>
+          </a:lnRef>
+          <a:fillRef idx="0">
+            <a:schemeClr val="accent1"/>
+          </a:fillRef>
+          <a:effectRef idx="0">
+            <a:schemeClr val="accent1"/>
+          </a:effectRef>
+          <a:fontRef idx="minor">
+            <a:schemeClr val="tx1"/>
+          </a:fontRef>
+        </p:style>
+      </p:cxnSp>
+      <p:cxnSp>
+        <p:nvCxnSpPr>
+          <p:cNvPr id="27" name="Straight Arrow Connector 26">
+            <a:extLst>
+              <a:ext uri="{FF2B5EF4-FFF2-40B4-BE49-F238E27FC236}">
+                <a16:creationId xmlns:a16="http://schemas.microsoft.com/office/drawing/2014/main" id="{F01A7713-587F-FACE-7EF4-D77C909CCCEB}"/>
+              </a:ext>
+            </a:extLst>
+          </p:cNvPr>
+          <p:cNvCxnSpPr>
+            <a:cxnSpLocks/>
+          </p:cNvCxnSpPr>
+          <p:nvPr/>
+        </p:nvCxnSpPr>
+        <p:spPr>
+          <a:xfrm rot="2700000">
+            <a:off x="3086682" y="4721995"/>
+            <a:ext cx="335521" cy="0"/>
+          </a:xfrm>
+          <a:prstGeom prst="straightConnector1">
+            <a:avLst/>
+          </a:prstGeom>
+          <a:ln w="50800">
+            <a:tailEnd type="triangle"/>
+          </a:ln>
+        </p:spPr>
+        <p:style>
+          <a:lnRef idx="1">
+            <a:schemeClr val="accent1"/>
+          </a:lnRef>
+          <a:fillRef idx="0">
+            <a:schemeClr val="accent1"/>
+          </a:fillRef>
+          <a:effectRef idx="0">
+            <a:schemeClr val="accent1"/>
+          </a:effectRef>
+          <a:fontRef idx="minor">
+            <a:schemeClr val="tx1"/>
+          </a:fontRef>
+        </p:style>
+      </p:cxnSp>
+      <p:cxnSp>
+        <p:nvCxnSpPr>
+          <p:cNvPr id="31" name="Straight Connector 30">
+            <a:extLst>
+              <a:ext uri="{FF2B5EF4-FFF2-40B4-BE49-F238E27FC236}">
+                <a16:creationId xmlns:a16="http://schemas.microsoft.com/office/drawing/2014/main" id="{9925169A-800C-354A-9542-BB1FE3B9B6B9}"/>
+              </a:ext>
+            </a:extLst>
+          </p:cNvPr>
+          <p:cNvCxnSpPr>
+            <a:cxnSpLocks/>
+          </p:cNvCxnSpPr>
+          <p:nvPr/>
+        </p:nvCxnSpPr>
+        <p:spPr>
+          <a:xfrm flipH="1">
+            <a:off x="3555081" y="4558766"/>
+            <a:ext cx="7788271" cy="0"/>
+          </a:xfrm>
+          <a:prstGeom prst="line">
+            <a:avLst/>
+          </a:prstGeom>
+          <a:ln w="28575">
+            <a:prstDash val="dash"/>
+          </a:ln>
+        </p:spPr>
+        <p:style>
+          <a:lnRef idx="1">
+            <a:schemeClr val="accent1"/>
+          </a:lnRef>
+          <a:fillRef idx="0">
+            <a:schemeClr val="accent1"/>
+          </a:fillRef>
+          <a:effectRef idx="0">
+            <a:schemeClr val="accent1"/>
+          </a:effectRef>
+          <a:fontRef idx="minor">
+            <a:schemeClr val="tx1"/>
+          </a:fontRef>
+        </p:style>
+      </p:cxnSp>
+    </p:spTree>
+    <p:extLst>
+      <p:ext uri="{BB962C8B-B14F-4D97-AF65-F5344CB8AC3E}">
+        <p14:creationId xmlns:p14="http://schemas.microsoft.com/office/powerpoint/2010/main" val="4282169266"/>
       </p:ext>
     </p:extLst>
   </p:cSld>

</xml_diff>

<commit_message>
Fixed example.json and finalized presentation
</commit_message>
<xml_diff>
--- a/tskit_presentation.pptx
+++ b/tskit_presentation.pptx
@@ -4363,8 +4363,8 @@
         </p:nvSpPr>
         <p:spPr>
           <a:xfrm>
-            <a:off x="1463040" y="1231392"/>
-            <a:ext cx="3706368" cy="4395214"/>
+            <a:off x="1463040" y="2010945"/>
+            <a:ext cx="3706368" cy="2836111"/>
           </a:xfrm>
           <a:prstGeom prst="rect">
             <a:avLst/>
@@ -4405,10 +4405,10 @@
       </p:sp>
       <p:pic>
         <p:nvPicPr>
-          <p:cNvPr id="9" name="Picture 8" descr="A screenshot of a computer code&#10;&#10;Description automatically generated">
-            <a:extLst>
-              <a:ext uri="{FF2B5EF4-FFF2-40B4-BE49-F238E27FC236}">
-                <a16:creationId xmlns:a16="http://schemas.microsoft.com/office/drawing/2014/main" id="{0E022537-F842-DB08-FD65-5E5CF7DDF811}"/>
+          <p:cNvPr id="4" name="Picture 3" descr="A screenshot of a computer&#10;&#10;Description automatically generated">
+            <a:extLst>
+              <a:ext uri="{FF2B5EF4-FFF2-40B4-BE49-F238E27FC236}">
+                <a16:creationId xmlns:a16="http://schemas.microsoft.com/office/drawing/2014/main" id="{B8E0C30E-836E-AF59-1505-BC101C09EF88}"/>
               </a:ext>
             </a:extLst>
           </p:cNvPr>
@@ -4417,16 +4417,15 @@
           </p:cNvPicPr>
           <p:nvPr/>
         </p:nvPicPr>
-        <p:blipFill>
+        <p:blipFill rotWithShape="1">
           <a:blip r:embed="rId3"/>
-          <a:stretch>
-            <a:fillRect/>
-          </a:stretch>
+          <a:srcRect t="8889"/>
+          <a:stretch/>
         </p:blipFill>
         <p:spPr>
           <a:xfrm>
-            <a:off x="1620774" y="1352549"/>
-            <a:ext cx="3390900" cy="4152900"/>
+            <a:off x="5797235" y="570513"/>
+            <a:ext cx="5879545" cy="5716974"/>
           </a:xfrm>
           <a:prstGeom prst="rect">
             <a:avLst/>
@@ -4435,10 +4434,10 @@
       </p:pic>
       <p:pic>
         <p:nvPicPr>
-          <p:cNvPr id="2" name="Picture 1" descr="A screenshot of a computer&#10;&#10;Description automatically generated">
-            <a:extLst>
-              <a:ext uri="{FF2B5EF4-FFF2-40B4-BE49-F238E27FC236}">
-                <a16:creationId xmlns:a16="http://schemas.microsoft.com/office/drawing/2014/main" id="{902338C6-FA68-7400-0C1A-480271D50E75}"/>
+          <p:cNvPr id="7" name="Picture 6" descr="A screen shot of a computer code&#10;&#10;Description automatically generated">
+            <a:extLst>
+              <a:ext uri="{FF2B5EF4-FFF2-40B4-BE49-F238E27FC236}">
+                <a16:creationId xmlns:a16="http://schemas.microsoft.com/office/drawing/2014/main" id="{D22A63B8-8F9D-CD84-9BB9-40BA4FC2F113}"/>
               </a:ext>
             </a:extLst>
           </p:cNvPr>
@@ -4449,13 +4448,13 @@
         </p:nvPicPr>
         <p:blipFill rotWithShape="1">
           <a:blip r:embed="rId4"/>
-          <a:srcRect t="8390"/>
+          <a:srcRect t="1612"/>
           <a:stretch/>
         </p:blipFill>
         <p:spPr>
           <a:xfrm>
-            <a:off x="6243418" y="707237"/>
-            <a:ext cx="5624990" cy="5443527"/>
+            <a:off x="1555008" y="2125718"/>
+            <a:ext cx="3522431" cy="2606565"/>
           </a:xfrm>
           <a:prstGeom prst="rect">
             <a:avLst/>
@@ -5231,10 +5230,10 @@
       </p:grpSpPr>
       <p:pic>
         <p:nvPicPr>
-          <p:cNvPr id="14" name="Picture 13" descr="A screenshot of a computer&#10;&#10;Description automatically generated">
-            <a:extLst>
-              <a:ext uri="{FF2B5EF4-FFF2-40B4-BE49-F238E27FC236}">
-                <a16:creationId xmlns:a16="http://schemas.microsoft.com/office/drawing/2014/main" id="{6BBA1B56-8A9B-3E66-CE84-C5A0B56326B7}"/>
+          <p:cNvPr id="6" name="Picture 5" descr="A screenshot of a computer&#10;&#10;Description automatically generated">
+            <a:extLst>
+              <a:ext uri="{FF2B5EF4-FFF2-40B4-BE49-F238E27FC236}">
+                <a16:creationId xmlns:a16="http://schemas.microsoft.com/office/drawing/2014/main" id="{06154C2E-5EAE-162A-D45D-AAB8EB1B9620}"/>
               </a:ext>
             </a:extLst>
           </p:cNvPr>
@@ -5251,8 +5250,8 @@
         </p:blipFill>
         <p:spPr>
           <a:xfrm>
-            <a:off x="3653239" y="797011"/>
-            <a:ext cx="4885521" cy="5263977"/>
+            <a:off x="3360167" y="509283"/>
+            <a:ext cx="5471667" cy="5839434"/>
           </a:xfrm>
           <a:prstGeom prst="rect">
             <a:avLst/>
@@ -5291,10 +5290,10 @@
       </p:grpSpPr>
       <p:pic>
         <p:nvPicPr>
-          <p:cNvPr id="14" name="Picture 13" descr="A screenshot of a computer&#10;&#10;Description automatically generated">
-            <a:extLst>
-              <a:ext uri="{FF2B5EF4-FFF2-40B4-BE49-F238E27FC236}">
-                <a16:creationId xmlns:a16="http://schemas.microsoft.com/office/drawing/2014/main" id="{6BBA1B56-8A9B-3E66-CE84-C5A0B56326B7}"/>
+          <p:cNvPr id="5" name="Picture 4" descr="A screenshot of a computer&#10;&#10;Description automatically generated">
+            <a:extLst>
+              <a:ext uri="{FF2B5EF4-FFF2-40B4-BE49-F238E27FC236}">
+                <a16:creationId xmlns:a16="http://schemas.microsoft.com/office/drawing/2014/main" id="{AC9B39B4-AF5C-AFCB-096E-1C5307E6241C}"/>
               </a:ext>
             </a:extLst>
           </p:cNvPr>
@@ -5311,8 +5310,8 @@
         </p:blipFill>
         <p:spPr>
           <a:xfrm>
-            <a:off x="3653239" y="797011"/>
-            <a:ext cx="4885521" cy="5263977"/>
+            <a:off x="3360167" y="509283"/>
+            <a:ext cx="5471667" cy="5839434"/>
           </a:xfrm>
           <a:prstGeom prst="rect">
             <a:avLst/>
@@ -5453,10 +5452,10 @@
       </p:grpSpPr>
       <p:pic>
         <p:nvPicPr>
-          <p:cNvPr id="14" name="Picture 13" descr="A screenshot of a computer&#10;&#10;Description automatically generated">
-            <a:extLst>
-              <a:ext uri="{FF2B5EF4-FFF2-40B4-BE49-F238E27FC236}">
-                <a16:creationId xmlns:a16="http://schemas.microsoft.com/office/drawing/2014/main" id="{6BBA1B56-8A9B-3E66-CE84-C5A0B56326B7}"/>
+          <p:cNvPr id="6" name="Picture 5" descr="A screenshot of a computer&#10;&#10;Description automatically generated">
+            <a:extLst>
+              <a:ext uri="{FF2B5EF4-FFF2-40B4-BE49-F238E27FC236}">
+                <a16:creationId xmlns:a16="http://schemas.microsoft.com/office/drawing/2014/main" id="{FCF56B66-278C-EE68-5202-3C39E7E1E15C}"/>
               </a:ext>
             </a:extLst>
           </p:cNvPr>
@@ -5473,8 +5472,8 @@
         </p:blipFill>
         <p:spPr>
           <a:xfrm>
-            <a:off x="3653239" y="797011"/>
-            <a:ext cx="4885521" cy="5263977"/>
+            <a:off x="3360167" y="509283"/>
+            <a:ext cx="5471667" cy="5839434"/>
           </a:xfrm>
           <a:prstGeom prst="rect">
             <a:avLst/>
@@ -5495,7 +5494,7 @@
         </p:nvSpPr>
         <p:spPr>
           <a:xfrm>
-            <a:off x="812356" y="3694269"/>
+            <a:off x="812356" y="3526109"/>
             <a:ext cx="2315929" cy="923330"/>
           </a:xfrm>
           <a:prstGeom prst="rect">
@@ -5538,7 +5537,7 @@
         </p:nvCxnSpPr>
         <p:spPr>
           <a:xfrm>
-            <a:off x="3303270" y="4155934"/>
+            <a:off x="3303270" y="3987774"/>
             <a:ext cx="1025637" cy="0"/>
           </a:xfrm>
           <a:prstGeom prst="straightConnector1">
@@ -5598,10 +5597,10 @@
       </p:grpSpPr>
       <p:pic>
         <p:nvPicPr>
-          <p:cNvPr id="14" name="Picture 13" descr="A screenshot of a computer&#10;&#10;Description automatically generated">
-            <a:extLst>
-              <a:ext uri="{FF2B5EF4-FFF2-40B4-BE49-F238E27FC236}">
-                <a16:creationId xmlns:a16="http://schemas.microsoft.com/office/drawing/2014/main" id="{6BBA1B56-8A9B-3E66-CE84-C5A0B56326B7}"/>
+          <p:cNvPr id="4" name="Picture 3" descr="A screenshot of a computer&#10;&#10;Description automatically generated">
+            <a:extLst>
+              <a:ext uri="{FF2B5EF4-FFF2-40B4-BE49-F238E27FC236}">
+                <a16:creationId xmlns:a16="http://schemas.microsoft.com/office/drawing/2014/main" id="{89D3C0B4-5669-B46E-3FE7-4F59BF748A59}"/>
               </a:ext>
             </a:extLst>
           </p:cNvPr>
@@ -5618,8 +5617,8 @@
         </p:blipFill>
         <p:spPr>
           <a:xfrm>
-            <a:off x="3653239" y="797011"/>
-            <a:ext cx="4885521" cy="5263977"/>
+            <a:off x="3360167" y="509283"/>
+            <a:ext cx="5471667" cy="5839434"/>
           </a:xfrm>
           <a:prstGeom prst="rect">
             <a:avLst/>
@@ -5882,10 +5881,10 @@
       </p:grpSpPr>
       <p:pic>
         <p:nvPicPr>
-          <p:cNvPr id="14" name="Picture 13" descr="A screenshot of a computer&#10;&#10;Description automatically generated">
-            <a:extLst>
-              <a:ext uri="{FF2B5EF4-FFF2-40B4-BE49-F238E27FC236}">
-                <a16:creationId xmlns:a16="http://schemas.microsoft.com/office/drawing/2014/main" id="{6BBA1B56-8A9B-3E66-CE84-C5A0B56326B7}"/>
+          <p:cNvPr id="2" name="Picture 1" descr="A screenshot of a computer&#10;&#10;Description automatically generated">
+            <a:extLst>
+              <a:ext uri="{FF2B5EF4-FFF2-40B4-BE49-F238E27FC236}">
+                <a16:creationId xmlns:a16="http://schemas.microsoft.com/office/drawing/2014/main" id="{4D0E88CB-6441-2B66-D145-E8AA897002CF}"/>
               </a:ext>
             </a:extLst>
           </p:cNvPr>
@@ -5902,8 +5901,8 @@
         </p:blipFill>
         <p:spPr>
           <a:xfrm>
-            <a:off x="3653239" y="797011"/>
-            <a:ext cx="4885521" cy="5263977"/>
+            <a:off x="3360167" y="509283"/>
+            <a:ext cx="5471667" cy="5839434"/>
           </a:xfrm>
           <a:prstGeom prst="rect">
             <a:avLst/>
@@ -5926,7 +5925,7 @@
         </p:nvCxnSpPr>
         <p:spPr>
           <a:xfrm rot="10800000">
-            <a:off x="8362588" y="5166745"/>
+            <a:off x="8362588" y="5019605"/>
             <a:ext cx="506627" cy="0"/>
           </a:xfrm>
           <a:prstGeom prst="straightConnector1">
@@ -5968,7 +5967,7 @@
         </p:nvSpPr>
         <p:spPr>
           <a:xfrm>
-            <a:off x="8995961" y="4151082"/>
+            <a:off x="8995961" y="4003942"/>
             <a:ext cx="2298357" cy="2031325"/>
           </a:xfrm>
           <a:prstGeom prst="rect">
@@ -6027,10 +6026,10 @@
       </p:grpSpPr>
       <p:pic>
         <p:nvPicPr>
-          <p:cNvPr id="14" name="Picture 13" descr="A screenshot of a computer&#10;&#10;Description automatically generated">
-            <a:extLst>
-              <a:ext uri="{FF2B5EF4-FFF2-40B4-BE49-F238E27FC236}">
-                <a16:creationId xmlns:a16="http://schemas.microsoft.com/office/drawing/2014/main" id="{6BBA1B56-8A9B-3E66-CE84-C5A0B56326B7}"/>
+          <p:cNvPr id="3" name="Picture 2" descr="A screenshot of a computer&#10;&#10;Description automatically generated">
+            <a:extLst>
+              <a:ext uri="{FF2B5EF4-FFF2-40B4-BE49-F238E27FC236}">
+                <a16:creationId xmlns:a16="http://schemas.microsoft.com/office/drawing/2014/main" id="{7D00EF1F-AB3C-D52D-41E6-2032F295332B}"/>
               </a:ext>
             </a:extLst>
           </p:cNvPr>
@@ -6047,8 +6046,8 @@
         </p:blipFill>
         <p:spPr>
           <a:xfrm>
-            <a:off x="3653239" y="797011"/>
-            <a:ext cx="4885521" cy="5263977"/>
+            <a:off x="3360167" y="509283"/>
+            <a:ext cx="5471667" cy="5839434"/>
           </a:xfrm>
           <a:prstGeom prst="rect">
             <a:avLst/>
@@ -6069,8 +6068,8 @@
         </p:nvSpPr>
         <p:spPr>
           <a:xfrm>
-            <a:off x="6804201" y="253452"/>
-            <a:ext cx="2747372" cy="1754326"/>
+            <a:off x="6804200" y="509283"/>
+            <a:ext cx="3937371" cy="1200329"/>
           </a:xfrm>
           <a:prstGeom prst="rect">
             <a:avLst/>
@@ -6112,7 +6111,7 @@
         </p:nvCxnSpPr>
         <p:spPr>
           <a:xfrm rot="9000000">
-            <a:off x="6223325" y="1881121"/>
+            <a:off x="6223325" y="1712961"/>
             <a:ext cx="506627" cy="0"/>
           </a:xfrm>
           <a:prstGeom prst="straightConnector1">
@@ -6168,7 +6167,7 @@
         </p:blipFill>
         <p:spPr>
           <a:xfrm rot="15969267">
-            <a:off x="5804926" y="2155337"/>
+            <a:off x="5857476" y="1892587"/>
             <a:ext cx="400359" cy="400359"/>
           </a:xfrm>
           <a:prstGeom prst="rect">
@@ -6208,10 +6207,10 @@
       </p:grpSpPr>
       <p:pic>
         <p:nvPicPr>
-          <p:cNvPr id="14" name="Picture 13" descr="A screenshot of a computer&#10;&#10;Description automatically generated">
-            <a:extLst>
-              <a:ext uri="{FF2B5EF4-FFF2-40B4-BE49-F238E27FC236}">
-                <a16:creationId xmlns:a16="http://schemas.microsoft.com/office/drawing/2014/main" id="{6BBA1B56-8A9B-3E66-CE84-C5A0B56326B7}"/>
+          <p:cNvPr id="2" name="Picture 1" descr="A screenshot of a computer&#10;&#10;Description automatically generated">
+            <a:extLst>
+              <a:ext uri="{FF2B5EF4-FFF2-40B4-BE49-F238E27FC236}">
+                <a16:creationId xmlns:a16="http://schemas.microsoft.com/office/drawing/2014/main" id="{4DA364D9-AB13-AD0F-82A6-F9CA9B43AE2E}"/>
               </a:ext>
             </a:extLst>
           </p:cNvPr>
@@ -6228,8 +6227,8 @@
         </p:blipFill>
         <p:spPr>
           <a:xfrm>
-            <a:off x="3653239" y="797011"/>
-            <a:ext cx="4885521" cy="5263977"/>
+            <a:off x="3360167" y="509283"/>
+            <a:ext cx="5471667" cy="5839434"/>
           </a:xfrm>
           <a:prstGeom prst="rect">
             <a:avLst/>
@@ -6666,10 +6665,10 @@
       </p:grpSpPr>
       <p:pic>
         <p:nvPicPr>
-          <p:cNvPr id="14" name="Picture 13" descr="A screenshot of a computer&#10;&#10;Description automatically generated">
-            <a:extLst>
-              <a:ext uri="{FF2B5EF4-FFF2-40B4-BE49-F238E27FC236}">
-                <a16:creationId xmlns:a16="http://schemas.microsoft.com/office/drawing/2014/main" id="{6BBA1B56-8A9B-3E66-CE84-C5A0B56326B7}"/>
+          <p:cNvPr id="4" name="Picture 3" descr="A screenshot of a computer&#10;&#10;Description automatically generated">
+            <a:extLst>
+              <a:ext uri="{FF2B5EF4-FFF2-40B4-BE49-F238E27FC236}">
+                <a16:creationId xmlns:a16="http://schemas.microsoft.com/office/drawing/2014/main" id="{AC506128-D57B-65C7-C190-CDDBAFE75922}"/>
               </a:ext>
             </a:extLst>
           </p:cNvPr>
@@ -6686,8 +6685,8 @@
         </p:blipFill>
         <p:spPr>
           <a:xfrm>
-            <a:off x="3653239" y="797011"/>
-            <a:ext cx="4885521" cy="5263977"/>
+            <a:off x="3360167" y="509283"/>
+            <a:ext cx="5471667" cy="5839434"/>
           </a:xfrm>
           <a:prstGeom prst="rect">
             <a:avLst/>
@@ -6709,8 +6708,8 @@
           <p:nvPr/>
         </p:nvCxnSpPr>
         <p:spPr>
-          <a:xfrm>
-            <a:off x="3053934" y="1170619"/>
+          <a:xfrm flipH="1">
+            <a:off x="6537436" y="775597"/>
             <a:ext cx="506627" cy="0"/>
           </a:xfrm>
           <a:prstGeom prst="straightConnector1">
@@ -6752,8 +6751,8 @@
         </p:nvSpPr>
         <p:spPr>
           <a:xfrm>
-            <a:off x="755577" y="570454"/>
-            <a:ext cx="2298357" cy="2031325"/>
+            <a:off x="7170345" y="316957"/>
+            <a:ext cx="4363769" cy="1200329"/>
           </a:xfrm>
           <a:prstGeom prst="rect">
             <a:avLst/>
@@ -6774,7 +6773,7 @@
                 <a:latin typeface="Arial" panose="020B0604020202020204" pitchFamily="34" charset="0"/>
                 <a:cs typeface="Arial" panose="020B0604020202020204" pitchFamily="34" charset="0"/>
               </a:rPr>
-              <a:t>EXPERIMENTAL: this unfixes the x-axis positions of all nodes except the samples and allows the simulation to reposition the nodes</a:t>
+              <a:t>Reheat Simulation (experimental): this unfixes the x-axis positions of all nodes except the samples and allows the simulation to reposition the nodes</a:t>
             </a:r>
           </a:p>
         </p:txBody>
@@ -6809,6 +6808,36 @@
           <a:chExt cx="0" cy="0"/>
         </a:xfrm>
       </p:grpSpPr>
+      <p:pic>
+        <p:nvPicPr>
+          <p:cNvPr id="2" name="Picture 1" descr="A screenshot of a computer&#10;&#10;Description automatically generated">
+            <a:extLst>
+              <a:ext uri="{FF2B5EF4-FFF2-40B4-BE49-F238E27FC236}">
+                <a16:creationId xmlns:a16="http://schemas.microsoft.com/office/drawing/2014/main" id="{B8255DB8-90B3-89F2-4B35-C51F66C4A82D}"/>
+              </a:ext>
+            </a:extLst>
+          </p:cNvPr>
+          <p:cNvPicPr>
+            <a:picLocks noChangeAspect="1"/>
+          </p:cNvPicPr>
+          <p:nvPr/>
+        </p:nvPicPr>
+        <p:blipFill>
+          <a:blip r:embed="rId2"/>
+          <a:stretch>
+            <a:fillRect/>
+          </a:stretch>
+        </p:blipFill>
+        <p:spPr>
+          <a:xfrm>
+            <a:off x="3360167" y="509283"/>
+            <a:ext cx="5471667" cy="5839434"/>
+          </a:xfrm>
+          <a:prstGeom prst="rect">
+            <a:avLst/>
+          </a:prstGeom>
+        </p:spPr>
+      </p:pic>
       <p:sp>
         <p:nvSpPr>
           <p:cNvPr id="9" name="Rectangle 8">
@@ -6859,36 +6888,6 @@
           </a:p>
         </p:txBody>
       </p:sp>
-      <p:pic>
-        <p:nvPicPr>
-          <p:cNvPr id="14" name="Picture 13" descr="A screenshot of a computer&#10;&#10;Description automatically generated">
-            <a:extLst>
-              <a:ext uri="{FF2B5EF4-FFF2-40B4-BE49-F238E27FC236}">
-                <a16:creationId xmlns:a16="http://schemas.microsoft.com/office/drawing/2014/main" id="{6BBA1B56-8A9B-3E66-CE84-C5A0B56326B7}"/>
-              </a:ext>
-            </a:extLst>
-          </p:cNvPr>
-          <p:cNvPicPr>
-            <a:picLocks noChangeAspect="1"/>
-          </p:cNvPicPr>
-          <p:nvPr/>
-        </p:nvPicPr>
-        <p:blipFill>
-          <a:blip r:embed="rId2"/>
-          <a:stretch>
-            <a:fillRect/>
-          </a:stretch>
-        </p:blipFill>
-        <p:spPr>
-          <a:xfrm>
-            <a:off x="3653239" y="797011"/>
-            <a:ext cx="4885521" cy="5263977"/>
-          </a:xfrm>
-          <a:prstGeom prst="rect">
-            <a:avLst/>
-          </a:prstGeom>
-        </p:spPr>
-      </p:pic>
       <p:cxnSp>
         <p:nvCxnSpPr>
           <p:cNvPr id="4" name="Straight Arrow Connector 3">
@@ -6904,8 +6903,8 @@
           <p:nvPr/>
         </p:nvCxnSpPr>
         <p:spPr>
-          <a:xfrm rot="10800000">
-            <a:off x="5212644" y="955588"/>
+          <a:xfrm rot="10800000" flipH="1">
+            <a:off x="5231375" y="778033"/>
             <a:ext cx="506627" cy="0"/>
           </a:xfrm>
           <a:prstGeom prst="straightConnector1">
@@ -6947,7 +6946,7 @@
         </p:nvSpPr>
         <p:spPr>
           <a:xfrm>
-            <a:off x="5895539" y="355422"/>
+            <a:off x="1098533" y="177869"/>
             <a:ext cx="4052965" cy="1200329"/>
           </a:xfrm>
           <a:prstGeom prst="rect">
@@ -6974,21 +6973,125 @@
           </a:p>
         </p:txBody>
       </p:sp>
+      <p:sp>
+        <p:nvSpPr>
+          <p:cNvPr id="10" name="TextBox 9">
+            <a:extLst>
+              <a:ext uri="{FF2B5EF4-FFF2-40B4-BE49-F238E27FC236}">
+                <a16:creationId xmlns:a16="http://schemas.microsoft.com/office/drawing/2014/main" id="{1CDA38C4-92D6-1DEC-F0AD-1B762D1162A9}"/>
+              </a:ext>
+            </a:extLst>
+          </p:cNvPr>
+          <p:cNvSpPr txBox="1"/>
+          <p:nvPr/>
+        </p:nvSpPr>
+        <p:spPr>
+          <a:xfrm>
+            <a:off x="8641630" y="1679898"/>
+            <a:ext cx="3302720" cy="2339102"/>
+          </a:xfrm>
+          <a:prstGeom prst="rect">
+            <a:avLst/>
+          </a:prstGeom>
+          <a:noFill/>
+          <a:ln>
+            <a:noFill/>
+          </a:ln>
+        </p:spPr>
+        <p:txBody>
+          <a:bodyPr wrap="square" rtlCol="0">
+            <a:spAutoFit/>
+          </a:bodyPr>
+          <a:lstStyle/>
+          <a:p>
+            <a:pPr algn="ctr"/>
+            <a:r>
+              <a:rPr lang="en-US" sz="2800" dirty="0">
+                <a:solidFill>
+                  <a:srgbClr val="043D4D"/>
+                </a:solidFill>
+                <a:latin typeface="Arial" panose="020B0604020202020204" pitchFamily="34" charset="0"/>
+                <a:cs typeface="Arial" panose="020B0604020202020204" pitchFamily="34" charset="0"/>
+              </a:rPr>
+              <a:t>Steps to Replicate a Figure</a:t>
+            </a:r>
+          </a:p>
+          <a:p>
+            <a:endParaRPr lang="en-US" dirty="0">
+              <a:solidFill>
+                <a:srgbClr val="043D4D"/>
+              </a:solidFill>
+              <a:latin typeface="Arial" panose="020B0604020202020204" pitchFamily="34" charset="0"/>
+              <a:cs typeface="Arial" panose="020B0604020202020204" pitchFamily="34" charset="0"/>
+            </a:endParaRPr>
+          </a:p>
+          <a:p>
+            <a:r>
+              <a:rPr lang="en-US" dirty="0">
+                <a:solidFill>
+                  <a:srgbClr val="043D4D"/>
+                </a:solidFill>
+                <a:latin typeface="Arial" panose="020B0604020202020204" pitchFamily="34" charset="0"/>
+                <a:cs typeface="Arial" panose="020B0604020202020204" pitchFamily="34" charset="0"/>
+              </a:rPr>
+              <a:t>Paste the copied JSON object into a “.</a:t>
+            </a:r>
+            <a:r>
+              <a:rPr lang="en-US" dirty="0" err="1">
+                <a:solidFill>
+                  <a:srgbClr val="043D4D"/>
+                </a:solidFill>
+                <a:latin typeface="Arial" panose="020B0604020202020204" pitchFamily="34" charset="0"/>
+                <a:cs typeface="Arial" panose="020B0604020202020204" pitchFamily="34" charset="0"/>
+              </a:rPr>
+              <a:t>json</a:t>
+            </a:r>
+            <a:r>
+              <a:rPr lang="en-US" dirty="0">
+                <a:solidFill>
+                  <a:srgbClr val="043D4D"/>
+                </a:solidFill>
+                <a:latin typeface="Arial" panose="020B0604020202020204" pitchFamily="34" charset="0"/>
+                <a:cs typeface="Arial" panose="020B0604020202020204" pitchFamily="34" charset="0"/>
+              </a:rPr>
+              <a:t>” file and run the following (replacing “</a:t>
+            </a:r>
+            <a:r>
+              <a:rPr lang="en-US" dirty="0" err="1">
+                <a:solidFill>
+                  <a:srgbClr val="043D4D"/>
+                </a:solidFill>
+                <a:latin typeface="Arial" panose="020B0604020202020204" pitchFamily="34" charset="0"/>
+                <a:cs typeface="Arial" panose="020B0604020202020204" pitchFamily="34" charset="0"/>
+              </a:rPr>
+              <a:t>example.json</a:t>
+            </a:r>
+            <a:r>
+              <a:rPr lang="en-US" dirty="0">
+                <a:solidFill>
+                  <a:srgbClr val="043D4D"/>
+                </a:solidFill>
+                <a:latin typeface="Arial" panose="020B0604020202020204" pitchFamily="34" charset="0"/>
+                <a:cs typeface="Arial" panose="020B0604020202020204" pitchFamily="34" charset="0"/>
+              </a:rPr>
+              <a:t>” with your file):</a:t>
+            </a:r>
+          </a:p>
+        </p:txBody>
+      </p:sp>
       <p:pic>
         <p:nvPicPr>
-          <p:cNvPr id="6" name="Content Placeholder 4" descr="A close-up of text&#10;&#10;Description automatically generated">
-            <a:extLst>
-              <a:ext uri="{FF2B5EF4-FFF2-40B4-BE49-F238E27FC236}">
-                <a16:creationId xmlns:a16="http://schemas.microsoft.com/office/drawing/2014/main" id="{B5284A2D-5A8E-AA66-B623-FCFD603B308C}"/>
+          <p:cNvPr id="7" name="Picture 6" descr="A close-up of a computer code&#10;&#10;Description automatically generated">
+            <a:extLst>
+              <a:ext uri="{FF2B5EF4-FFF2-40B4-BE49-F238E27FC236}">
+                <a16:creationId xmlns:a16="http://schemas.microsoft.com/office/drawing/2014/main" id="{4CD426A4-E27A-5C27-BC99-EC436F28825C}"/>
               </a:ext>
             </a:extLst>
           </p:cNvPr>
           <p:cNvPicPr>
-            <a:picLocks noGrp="1" noChangeAspect="1"/>
+            <a:picLocks noChangeAspect="1"/>
           </p:cNvPicPr>
-          <p:nvPr>
-            <p:ph idx="1"/>
-          </p:nvPr>
+          <p:nvPr/>
         </p:nvPicPr>
         <p:blipFill>
           <a:blip r:embed="rId3"/>
@@ -6998,117 +7101,14 @@
         </p:blipFill>
         <p:spPr>
           <a:xfrm>
-            <a:off x="8768038" y="4239933"/>
-            <a:ext cx="3038474" cy="717236"/>
-          </a:xfrm>
+            <a:off x="8753608" y="4239932"/>
+            <a:ext cx="3067333" cy="717237"/>
+          </a:xfrm>
+          <a:prstGeom prst="rect">
+            <a:avLst/>
+          </a:prstGeom>
         </p:spPr>
       </p:pic>
-      <p:sp>
-        <p:nvSpPr>
-          <p:cNvPr id="10" name="TextBox 9">
-            <a:extLst>
-              <a:ext uri="{FF2B5EF4-FFF2-40B4-BE49-F238E27FC236}">
-                <a16:creationId xmlns:a16="http://schemas.microsoft.com/office/drawing/2014/main" id="{1CDA38C4-92D6-1DEC-F0AD-1B762D1162A9}"/>
-              </a:ext>
-            </a:extLst>
-          </p:cNvPr>
-          <p:cNvSpPr txBox="1"/>
-          <p:nvPr/>
-        </p:nvSpPr>
-        <p:spPr>
-          <a:xfrm>
-            <a:off x="8641630" y="1679898"/>
-            <a:ext cx="3302720" cy="2339102"/>
-          </a:xfrm>
-          <a:prstGeom prst="rect">
-            <a:avLst/>
-          </a:prstGeom>
-          <a:noFill/>
-          <a:ln>
-            <a:noFill/>
-          </a:ln>
-        </p:spPr>
-        <p:txBody>
-          <a:bodyPr wrap="square" rtlCol="0">
-            <a:spAutoFit/>
-          </a:bodyPr>
-          <a:lstStyle/>
-          <a:p>
-            <a:pPr algn="ctr"/>
-            <a:r>
-              <a:rPr lang="en-US" sz="2800" dirty="0">
-                <a:solidFill>
-                  <a:srgbClr val="043D4D"/>
-                </a:solidFill>
-                <a:latin typeface="Arial" panose="020B0604020202020204" pitchFamily="34" charset="0"/>
-                <a:cs typeface="Arial" panose="020B0604020202020204" pitchFamily="34" charset="0"/>
-              </a:rPr>
-              <a:t>Steps to Replicate a Figure</a:t>
-            </a:r>
-          </a:p>
-          <a:p>
-            <a:endParaRPr lang="en-US" dirty="0">
-              <a:solidFill>
-                <a:srgbClr val="043D4D"/>
-              </a:solidFill>
-              <a:latin typeface="Arial" panose="020B0604020202020204" pitchFamily="34" charset="0"/>
-              <a:cs typeface="Arial" panose="020B0604020202020204" pitchFamily="34" charset="0"/>
-            </a:endParaRPr>
-          </a:p>
-          <a:p>
-            <a:r>
-              <a:rPr lang="en-US" dirty="0">
-                <a:solidFill>
-                  <a:srgbClr val="043D4D"/>
-                </a:solidFill>
-                <a:latin typeface="Arial" panose="020B0604020202020204" pitchFamily="34" charset="0"/>
-                <a:cs typeface="Arial" panose="020B0604020202020204" pitchFamily="34" charset="0"/>
-              </a:rPr>
-              <a:t>Paste the copied JSON object into a “.</a:t>
-            </a:r>
-            <a:r>
-              <a:rPr lang="en-US" dirty="0" err="1">
-                <a:solidFill>
-                  <a:srgbClr val="043D4D"/>
-                </a:solidFill>
-                <a:latin typeface="Arial" panose="020B0604020202020204" pitchFamily="34" charset="0"/>
-                <a:cs typeface="Arial" panose="020B0604020202020204" pitchFamily="34" charset="0"/>
-              </a:rPr>
-              <a:t>json</a:t>
-            </a:r>
-            <a:r>
-              <a:rPr lang="en-US" dirty="0">
-                <a:solidFill>
-                  <a:srgbClr val="043D4D"/>
-                </a:solidFill>
-                <a:latin typeface="Arial" panose="020B0604020202020204" pitchFamily="34" charset="0"/>
-                <a:cs typeface="Arial" panose="020B0604020202020204" pitchFamily="34" charset="0"/>
-              </a:rPr>
-              <a:t>” file and run the following (replacing “</a:t>
-            </a:r>
-            <a:r>
-              <a:rPr lang="en-US" dirty="0" err="1">
-                <a:solidFill>
-                  <a:srgbClr val="043D4D"/>
-                </a:solidFill>
-                <a:latin typeface="Arial" panose="020B0604020202020204" pitchFamily="34" charset="0"/>
-                <a:cs typeface="Arial" panose="020B0604020202020204" pitchFamily="34" charset="0"/>
-              </a:rPr>
-              <a:t>example.json</a:t>
-            </a:r>
-            <a:r>
-              <a:rPr lang="en-US" dirty="0">
-                <a:solidFill>
-                  <a:srgbClr val="043D4D"/>
-                </a:solidFill>
-                <a:latin typeface="Arial" panose="020B0604020202020204" pitchFamily="34" charset="0"/>
-                <a:cs typeface="Arial" panose="020B0604020202020204" pitchFamily="34" charset="0"/>
-              </a:rPr>
-              <a:t>” with your file):</a:t>
-            </a:r>
-          </a:p>
-        </p:txBody>
-      </p:sp>
     </p:spTree>
     <p:extLst>
       <p:ext uri="{BB962C8B-B14F-4D97-AF65-F5344CB8AC3E}">
@@ -7139,6 +7139,35 @@
           <a:chExt cx="0" cy="0"/>
         </a:xfrm>
       </p:grpSpPr>
+      <p:pic>
+        <p:nvPicPr>
+          <p:cNvPr id="3" name="Picture 2" descr="A screenshot of a graph&#10;&#10;Description automatically generated">
+            <a:extLst>
+              <a:ext uri="{FF2B5EF4-FFF2-40B4-BE49-F238E27FC236}">
+                <a16:creationId xmlns:a16="http://schemas.microsoft.com/office/drawing/2014/main" id="{9B58C493-FF43-266A-7C82-74E0C754F962}"/>
+              </a:ext>
+            </a:extLst>
+          </p:cNvPr>
+          <p:cNvPicPr>
+            <a:picLocks noChangeAspect="1"/>
+          </p:cNvPicPr>
+          <p:nvPr/>
+        </p:nvPicPr>
+        <p:blipFill rotWithShape="1">
+          <a:blip r:embed="rId2"/>
+          <a:srcRect t="7186"/>
+          <a:stretch/>
+        </p:blipFill>
+        <p:spPr>
+          <a:xfrm>
+            <a:off x="1148577" y="1816290"/>
+            <a:ext cx="4560846" cy="4527921"/>
+          </a:xfrm>
+          <a:prstGeom prst="rect">
+            <a:avLst/>
+          </a:prstGeom>
+        </p:spPr>
+      </p:pic>
       <p:sp>
         <p:nvSpPr>
           <p:cNvPr id="5" name="TextBox 4">
@@ -7180,35 +7209,6 @@
           </a:p>
         </p:txBody>
       </p:sp>
-      <p:pic>
-        <p:nvPicPr>
-          <p:cNvPr id="23" name="Content Placeholder 22" descr="A diagram of lines and dots&#10;&#10;Description automatically generated">
-            <a:extLst>
-              <a:ext uri="{FF2B5EF4-FFF2-40B4-BE49-F238E27FC236}">
-                <a16:creationId xmlns:a16="http://schemas.microsoft.com/office/drawing/2014/main" id="{5DAF9310-9BAC-6B6C-1F1D-5F4BD88B4ECD}"/>
-              </a:ext>
-            </a:extLst>
-          </p:cNvPr>
-          <p:cNvPicPr>
-            <a:picLocks noGrp="1" noChangeAspect="1"/>
-          </p:cNvPicPr>
-          <p:nvPr>
-            <p:ph sz="half" idx="1"/>
-          </p:nvPr>
-        </p:nvPicPr>
-        <p:blipFill>
-          <a:blip r:embed="rId2"/>
-          <a:stretch>
-            <a:fillRect/>
-          </a:stretch>
-        </p:blipFill>
-        <p:spPr>
-          <a:xfrm>
-            <a:off x="1148577" y="1825625"/>
-            <a:ext cx="4560846" cy="4351338"/>
-          </a:xfrm>
-        </p:spPr>
-      </p:pic>
       <p:sp>
         <p:nvSpPr>
           <p:cNvPr id="24" name="Content Placeholder 10">
@@ -8733,10 +8733,10 @@
       </p:grpSpPr>
       <p:pic>
         <p:nvPicPr>
-          <p:cNvPr id="4" name="Picture 3" descr="A screenshot of a graph&#10;&#10;Description automatically generated">
-            <a:extLst>
-              <a:ext uri="{FF2B5EF4-FFF2-40B4-BE49-F238E27FC236}">
-                <a16:creationId xmlns:a16="http://schemas.microsoft.com/office/drawing/2014/main" id="{FE06C633-72F0-9E9C-8003-FD7CE1F8CEA7}"/>
+          <p:cNvPr id="13" name="Picture 12" descr="A screenshot of a graph&#10;&#10;Description automatically generated">
+            <a:extLst>
+              <a:ext uri="{FF2B5EF4-FFF2-40B4-BE49-F238E27FC236}">
+                <a16:creationId xmlns:a16="http://schemas.microsoft.com/office/drawing/2014/main" id="{F79A4937-DDFF-089C-99F1-C21CC7393F5F}"/>
               </a:ext>
             </a:extLst>
           </p:cNvPr>
@@ -8747,13 +8747,13 @@
         </p:nvPicPr>
         <p:blipFill rotWithShape="1">
           <a:blip r:embed="rId3"/>
-          <a:srcRect t="8389"/>
+          <a:srcRect t="8889"/>
           <a:stretch/>
         </p:blipFill>
         <p:spPr>
           <a:xfrm>
-            <a:off x="323592" y="707237"/>
-            <a:ext cx="5596234" cy="5443527"/>
+            <a:off x="143299" y="570513"/>
+            <a:ext cx="5882557" cy="5716975"/>
           </a:xfrm>
           <a:prstGeom prst="rect">
             <a:avLst/>
@@ -8762,10 +8762,10 @@
       </p:pic>
       <p:pic>
         <p:nvPicPr>
-          <p:cNvPr id="7" name="Picture 6" descr="A screenshot of a computer&#10;&#10;Description automatically generated">
-            <a:extLst>
-              <a:ext uri="{FF2B5EF4-FFF2-40B4-BE49-F238E27FC236}">
-                <a16:creationId xmlns:a16="http://schemas.microsoft.com/office/drawing/2014/main" id="{B0A7C332-75DA-B78F-C541-18A1CF6733F2}"/>
+          <p:cNvPr id="15" name="Picture 14" descr="A screenshot of a computer&#10;&#10;Description automatically generated">
+            <a:extLst>
+              <a:ext uri="{FF2B5EF4-FFF2-40B4-BE49-F238E27FC236}">
+                <a16:creationId xmlns:a16="http://schemas.microsoft.com/office/drawing/2014/main" id="{CBB7952D-EB8B-9F86-4EA4-C7B4F7079474}"/>
               </a:ext>
             </a:extLst>
           </p:cNvPr>
@@ -8776,13 +8776,13 @@
         </p:nvPicPr>
         <p:blipFill rotWithShape="1">
           <a:blip r:embed="rId4"/>
-          <a:srcRect t="8390"/>
+          <a:srcRect t="8889"/>
           <a:stretch/>
         </p:blipFill>
         <p:spPr>
           <a:xfrm>
-            <a:off x="6243418" y="707237"/>
-            <a:ext cx="5624990" cy="5443527"/>
+            <a:off x="6169155" y="570513"/>
+            <a:ext cx="5879545" cy="5716974"/>
           </a:xfrm>
           <a:prstGeom prst="rect">
             <a:avLst/>

</xml_diff>